<commit_message>
complete draft of SD-PON and SD-RAN
</commit_message>
<xml_diff>
--- a/access.pptx
+++ b/access.pptx
@@ -14083,7 +14083,7 @@
         </p:nvSpPr>
         <p:spPr>
           <a:xfrm>
-            <a:off x="7123100" y="673364"/>
+            <a:off x="7123100" y="305231"/>
             <a:ext cx="1087394" cy="360153"/>
           </a:xfrm>
           <a:prstGeom prst="roundRect">
@@ -14149,68 +14149,7 @@
         </p:nvSpPr>
         <p:spPr>
           <a:xfrm>
-            <a:off x="6682375" y="4433255"/>
-            <a:ext cx="1528119" cy="417522"/>
-          </a:xfrm>
-          <a:prstGeom prst="roundRect">
-            <a:avLst/>
-          </a:prstGeom>
-          <a:solidFill>
-            <a:schemeClr val="bg1"/>
-          </a:solidFill>
-          <a:ln w="28575">
-            <a:solidFill>
-              <a:schemeClr val="accent1"/>
-            </a:solidFill>
-          </a:ln>
-        </p:spPr>
-        <p:style>
-          <a:lnRef idx="2">
-            <a:schemeClr val="accent1">
-              <a:shade val="50000"/>
-            </a:schemeClr>
-          </a:lnRef>
-          <a:fillRef idx="1">
-            <a:schemeClr val="accent1"/>
-          </a:fillRef>
-          <a:effectRef idx="0">
-            <a:schemeClr val="accent1"/>
-          </a:effectRef>
-          <a:fontRef idx="minor">
-            <a:schemeClr val="lt1"/>
-          </a:fontRef>
-        </p:style>
-        <p:txBody>
-          <a:bodyPr rtlCol="0" anchor="ctr"/>
-          <a:lstStyle/>
-          <a:p>
-            <a:pPr algn="ctr"/>
-            <a:r>
-              <a:rPr lang="en-US" dirty="0">
-                <a:solidFill>
-                  <a:schemeClr val="tx1"/>
-                </a:solidFill>
-              </a:rPr>
-              <a:t>Fabric Switch</a:t>
-            </a:r>
-          </a:p>
-        </p:txBody>
-      </p:sp>
-      <p:sp>
-        <p:nvSpPr>
-          <p:cNvPr id="108" name="Rounded Rectangle 107">
-            <a:extLst>
-              <a:ext uri="{FF2B5EF4-FFF2-40B4-BE49-F238E27FC236}">
-                <a16:creationId xmlns:a16="http://schemas.microsoft.com/office/drawing/2014/main" id="{F6BF05F4-1691-DD40-99FA-BFDAB2BAD44E}"/>
-              </a:ext>
-            </a:extLst>
-          </p:cNvPr>
-          <p:cNvSpPr/>
-          <p:nvPr/>
-        </p:nvSpPr>
-        <p:spPr>
-          <a:xfrm>
-            <a:off x="6571071" y="4321951"/>
+            <a:off x="6682375" y="4492630"/>
             <a:ext cx="1528119" cy="417522"/>
           </a:xfrm>
           <a:prstGeom prst="roundRect">
@@ -15049,7 +14988,7 @@
         </p:nvSpPr>
         <p:spPr>
           <a:xfrm>
-            <a:off x="4121604" y="2491409"/>
+            <a:off x="4121604" y="2538909"/>
             <a:ext cx="1431056" cy="410817"/>
           </a:xfrm>
           <a:prstGeom prst="rect">
@@ -15113,8 +15052,8 @@
         </p:nvCxnSpPr>
         <p:spPr>
           <a:xfrm>
-            <a:off x="4837132" y="2902226"/>
-            <a:ext cx="8776" cy="1311429"/>
+            <a:off x="4837132" y="2949726"/>
+            <a:ext cx="8776" cy="1263929"/>
           </a:xfrm>
           <a:prstGeom prst="straightConnector1">
             <a:avLst/>
@@ -15318,14 +15257,12 @@
           </p:cNvPr>
           <p:cNvCxnSpPr>
             <a:cxnSpLocks/>
-            <a:stCxn id="96" idx="1"/>
-            <a:endCxn id="38" idx="3"/>
           </p:cNvCxnSpPr>
           <p:nvPr/>
         </p:nvCxnSpPr>
         <p:spPr>
           <a:xfrm flipH="1">
-            <a:off x="5609967" y="4419408"/>
+            <a:off x="5609967" y="4348158"/>
             <a:ext cx="849800" cy="4312"/>
           </a:xfrm>
           <a:prstGeom prst="line">
@@ -15364,7 +15301,7 @@
         </p:nvCxnSpPr>
         <p:spPr>
           <a:xfrm>
-            <a:off x="4845907" y="1183511"/>
+            <a:off x="4845907" y="1231011"/>
             <a:ext cx="8776" cy="1311429"/>
           </a:xfrm>
           <a:prstGeom prst="straightConnector1">
@@ -15407,7 +15344,7 @@
         </p:nvSpPr>
         <p:spPr>
           <a:xfrm>
-            <a:off x="4815771" y="2014315"/>
+            <a:off x="4815771" y="1871815"/>
             <a:ext cx="927754" cy="307777"/>
           </a:xfrm>
           <a:prstGeom prst="rect">
@@ -15442,7 +15379,7 @@
         </p:nvSpPr>
         <p:spPr>
           <a:xfrm>
-            <a:off x="6459767" y="4210647"/>
+            <a:off x="6459767" y="4139397"/>
             <a:ext cx="1528119" cy="417522"/>
           </a:xfrm>
           <a:prstGeom prst="roundRect">
@@ -15505,7 +15442,7 @@
         </p:nvCxnSpPr>
         <p:spPr>
           <a:xfrm>
-            <a:off x="7237669" y="1428108"/>
+            <a:off x="7237669" y="1356858"/>
             <a:ext cx="0" cy="2782539"/>
           </a:xfrm>
           <a:prstGeom prst="straightConnector1">
@@ -15548,7 +15485,7 @@
         </p:nvSpPr>
         <p:spPr>
           <a:xfrm>
-            <a:off x="4121604" y="1134069"/>
+            <a:off x="4121604" y="765936"/>
             <a:ext cx="4088890" cy="755374"/>
           </a:xfrm>
           <a:prstGeom prst="roundRect">
@@ -15585,10 +15522,10 @@
       </p:sp>
       <p:sp>
         <p:nvSpPr>
-          <p:cNvPr id="112" name="Rounded Rectangle 111">
-            <a:extLst>
-              <a:ext uri="{FF2B5EF4-FFF2-40B4-BE49-F238E27FC236}">
-                <a16:creationId xmlns:a16="http://schemas.microsoft.com/office/drawing/2014/main" id="{AA655F12-F06A-8B4D-9DA0-6A463AAB3799}"/>
+          <p:cNvPr id="113" name="Rounded Rectangle 112">
+            <a:extLst>
+              <a:ext uri="{FF2B5EF4-FFF2-40B4-BE49-F238E27FC236}">
+                <a16:creationId xmlns:a16="http://schemas.microsoft.com/office/drawing/2014/main" id="{5369AAE8-E0B1-1E47-BF42-99E4A9BBF3D7}"/>
               </a:ext>
             </a:extLst>
           </p:cNvPr>
@@ -15597,7 +15534,7 @@
         </p:nvSpPr>
         <p:spPr>
           <a:xfrm>
-            <a:off x="4121604" y="675729"/>
+            <a:off x="6784583" y="305231"/>
             <a:ext cx="1087394" cy="360153"/>
           </a:xfrm>
           <a:prstGeom prst="roundRect">
@@ -15644,17 +15581,17 @@
                   <a:schemeClr val="tx1"/>
                 </a:solidFill>
               </a:rPr>
-              <a:t>SD-PON</a:t>
-            </a:r>
-          </a:p>
-        </p:txBody>
-      </p:sp>
-      <p:sp>
-        <p:nvSpPr>
-          <p:cNvPr id="113" name="Rounded Rectangle 112">
-            <a:extLst>
-              <a:ext uri="{FF2B5EF4-FFF2-40B4-BE49-F238E27FC236}">
-                <a16:creationId xmlns:a16="http://schemas.microsoft.com/office/drawing/2014/main" id="{5369AAE8-E0B1-1E47-BF42-99E4A9BBF3D7}"/>
+              <a:t>SD-Fabric</a:t>
+            </a:r>
+          </a:p>
+        </p:txBody>
+      </p:sp>
+      <p:sp>
+        <p:nvSpPr>
+          <p:cNvPr id="116" name="Can 115">
+            <a:extLst>
+              <a:ext uri="{FF2B5EF4-FFF2-40B4-BE49-F238E27FC236}">
+                <a16:creationId xmlns:a16="http://schemas.microsoft.com/office/drawing/2014/main" id="{EAC0B66C-1182-E648-A573-B0F793C6852B}"/>
               </a:ext>
             </a:extLst>
           </p:cNvPr>
@@ -15663,73 +15600,7 @@
         </p:nvSpPr>
         <p:spPr>
           <a:xfrm>
-            <a:off x="6784583" y="673364"/>
-            <a:ext cx="1087394" cy="360153"/>
-          </a:xfrm>
-          <a:prstGeom prst="roundRect">
-            <a:avLst/>
-          </a:prstGeom>
-          <a:solidFill>
-            <a:schemeClr val="accent1">
-              <a:lumMod val="40000"/>
-              <a:lumOff val="60000"/>
-            </a:schemeClr>
-          </a:solidFill>
-          <a:ln w="19050">
-            <a:solidFill>
-              <a:schemeClr val="accent1">
-                <a:lumMod val="75000"/>
-              </a:schemeClr>
-            </a:solidFill>
-          </a:ln>
-        </p:spPr>
-        <p:style>
-          <a:lnRef idx="2">
-            <a:schemeClr val="accent1">
-              <a:shade val="50000"/>
-            </a:schemeClr>
-          </a:lnRef>
-          <a:fillRef idx="1">
-            <a:schemeClr val="accent1"/>
-          </a:fillRef>
-          <a:effectRef idx="0">
-            <a:schemeClr val="accent1"/>
-          </a:effectRef>
-          <a:fontRef idx="minor">
-            <a:schemeClr val="lt1"/>
-          </a:fontRef>
-        </p:style>
-        <p:txBody>
-          <a:bodyPr rtlCol="0" anchor="ctr"/>
-          <a:lstStyle/>
-          <a:p>
-            <a:pPr algn="ctr"/>
-            <a:r>
-              <a:rPr lang="en-US" sz="1400" dirty="0">
-                <a:solidFill>
-                  <a:schemeClr val="tx1"/>
-                </a:solidFill>
-              </a:rPr>
-              <a:t>SD-Fabric</a:t>
-            </a:r>
-          </a:p>
-        </p:txBody>
-      </p:sp>
-      <p:sp>
-        <p:nvSpPr>
-          <p:cNvPr id="116" name="Can 115">
-            <a:extLst>
-              <a:ext uri="{FF2B5EF4-FFF2-40B4-BE49-F238E27FC236}">
-                <a16:creationId xmlns:a16="http://schemas.microsoft.com/office/drawing/2014/main" id="{EAC0B66C-1182-E648-A573-B0F793C6852B}"/>
-              </a:ext>
-            </a:extLst>
-          </p:cNvPr>
-          <p:cNvSpPr/>
-          <p:nvPr/>
-        </p:nvSpPr>
-        <p:spPr>
-          <a:xfrm>
-            <a:off x="5793743" y="2491409"/>
+            <a:off x="5793743" y="2538909"/>
             <a:ext cx="401574" cy="410817"/>
           </a:xfrm>
           <a:prstGeom prst="can">
@@ -15779,7 +15650,7 @@
         </p:nvCxnSpPr>
         <p:spPr>
           <a:xfrm flipH="1">
-            <a:off x="5552660" y="2696818"/>
+            <a:off x="5552660" y="2744318"/>
             <a:ext cx="241083" cy="0"/>
           </a:xfrm>
           <a:prstGeom prst="straightConnector1">
@@ -15856,7 +15727,7 @@
         </p:nvSpPr>
         <p:spPr>
           <a:xfrm>
-            <a:off x="5800597" y="4389021"/>
+            <a:off x="5800597" y="4104014"/>
             <a:ext cx="421910" cy="276999"/>
           </a:xfrm>
           <a:prstGeom prst="rect">
@@ -15877,12 +15748,88 @@
           </a:p>
         </p:txBody>
       </p:sp>
-      <p:sp>
-        <p:nvSpPr>
-          <p:cNvPr id="121" name="Rounded Rectangle 120">
-            <a:extLst>
-              <a:ext uri="{FF2B5EF4-FFF2-40B4-BE49-F238E27FC236}">
-                <a16:creationId xmlns:a16="http://schemas.microsoft.com/office/drawing/2014/main" id="{8D1EBF82-3728-1D48-8397-9A20493CB129}"/>
+      <p:cxnSp>
+        <p:nvCxnSpPr>
+          <p:cNvPr id="123" name="Straight Arrow Connector 122">
+            <a:extLst>
+              <a:ext uri="{FF2B5EF4-FFF2-40B4-BE49-F238E27FC236}">
+                <a16:creationId xmlns:a16="http://schemas.microsoft.com/office/drawing/2014/main" id="{81C47C1A-24BA-8A46-8669-5F8CF0941778}"/>
+              </a:ext>
+            </a:extLst>
+          </p:cNvPr>
+          <p:cNvCxnSpPr>
+            <a:cxnSpLocks/>
+          </p:cNvCxnSpPr>
+          <p:nvPr/>
+        </p:nvCxnSpPr>
+        <p:spPr>
+          <a:xfrm>
+            <a:off x="7987886" y="4348158"/>
+            <a:ext cx="806576" cy="0"/>
+          </a:xfrm>
+          <a:prstGeom prst="straightConnector1">
+            <a:avLst/>
+          </a:prstGeom>
+          <a:ln w="19050">
+            <a:tailEnd type="triangle"/>
+          </a:ln>
+        </p:spPr>
+        <p:style>
+          <a:lnRef idx="1">
+            <a:schemeClr val="accent1"/>
+          </a:lnRef>
+          <a:fillRef idx="0">
+            <a:schemeClr val="accent1"/>
+          </a:fillRef>
+          <a:effectRef idx="0">
+            <a:schemeClr val="accent1"/>
+          </a:effectRef>
+          <a:fontRef idx="minor">
+            <a:schemeClr val="tx1"/>
+          </a:fontRef>
+        </p:style>
+      </p:cxnSp>
+      <p:sp>
+        <p:nvSpPr>
+          <p:cNvPr id="125" name="TextBox 124">
+            <a:extLst>
+              <a:ext uri="{FF2B5EF4-FFF2-40B4-BE49-F238E27FC236}">
+                <a16:creationId xmlns:a16="http://schemas.microsoft.com/office/drawing/2014/main" id="{3E33C132-9AA9-444A-B4F1-99BCD5E9867B}"/>
+              </a:ext>
+            </a:extLst>
+          </p:cNvPr>
+          <p:cNvSpPr txBox="1"/>
+          <p:nvPr/>
+        </p:nvSpPr>
+        <p:spPr>
+          <a:xfrm>
+            <a:off x="8788640" y="4187470"/>
+            <a:ext cx="796436" cy="338554"/>
+          </a:xfrm>
+          <a:prstGeom prst="rect">
+            <a:avLst/>
+          </a:prstGeom>
+          <a:noFill/>
+        </p:spPr>
+        <p:txBody>
+          <a:bodyPr wrap="none" rtlCol="0">
+            <a:spAutoFit/>
+          </a:bodyPr>
+          <a:lstStyle/>
+          <a:p>
+            <a:r>
+              <a:rPr lang="en-US" sz="1600" dirty="0"/>
+              <a:t>To BNG</a:t>
+            </a:r>
+          </a:p>
+        </p:txBody>
+      </p:sp>
+      <p:sp>
+        <p:nvSpPr>
+          <p:cNvPr id="138" name="Rounded Rectangle 137">
+            <a:extLst>
+              <a:ext uri="{FF2B5EF4-FFF2-40B4-BE49-F238E27FC236}">
+                <a16:creationId xmlns:a16="http://schemas.microsoft.com/office/drawing/2014/main" id="{A98295D2-424B-0846-93E4-8728D8F0E2F7}"/>
               </a:ext>
             </a:extLst>
           </p:cNvPr>
@@ -15891,7 +15838,7 @@
         </p:nvSpPr>
         <p:spPr>
           <a:xfrm>
-            <a:off x="5273833" y="673364"/>
+            <a:off x="4465266" y="305231"/>
             <a:ext cx="1087394" cy="360153"/>
           </a:xfrm>
           <a:prstGeom prst="roundRect">
@@ -15931,42 +15878,546 @@
           <a:bodyPr rtlCol="0" anchor="ctr"/>
           <a:lstStyle/>
           <a:p>
-            <a:pPr algn="ctr"/>
+            <a:pPr algn="r"/>
             <a:r>
               <a:rPr lang="en-US" sz="1400" dirty="0">
                 <a:solidFill>
                   <a:schemeClr val="tx1"/>
                 </a:solidFill>
               </a:rPr>
-              <a:t>DHCP</a:t>
-            </a:r>
-          </a:p>
-        </p:txBody>
-      </p:sp>
+              <a:t>…</a:t>
+            </a:r>
+          </a:p>
+        </p:txBody>
+      </p:sp>
+      <p:sp>
+        <p:nvSpPr>
+          <p:cNvPr id="139" name="Rounded Rectangle 138">
+            <a:extLst>
+              <a:ext uri="{FF2B5EF4-FFF2-40B4-BE49-F238E27FC236}">
+                <a16:creationId xmlns:a16="http://schemas.microsoft.com/office/drawing/2014/main" id="{6DD12411-D8E5-EB42-A7AC-443B663B74FE}"/>
+              </a:ext>
+            </a:extLst>
+          </p:cNvPr>
+          <p:cNvSpPr/>
+          <p:nvPr/>
+        </p:nvSpPr>
+        <p:spPr>
+          <a:xfrm>
+            <a:off x="4126749" y="305231"/>
+            <a:ext cx="1087394" cy="360153"/>
+          </a:xfrm>
+          <a:prstGeom prst="roundRect">
+            <a:avLst/>
+          </a:prstGeom>
+          <a:solidFill>
+            <a:schemeClr val="accent1">
+              <a:lumMod val="40000"/>
+              <a:lumOff val="60000"/>
+            </a:schemeClr>
+          </a:solidFill>
+          <a:ln w="19050">
+            <a:solidFill>
+              <a:schemeClr val="accent1">
+                <a:lumMod val="75000"/>
+              </a:schemeClr>
+            </a:solidFill>
+          </a:ln>
+        </p:spPr>
+        <p:style>
+          <a:lnRef idx="2">
+            <a:schemeClr val="accent1">
+              <a:shade val="50000"/>
+            </a:schemeClr>
+          </a:lnRef>
+          <a:fillRef idx="1">
+            <a:schemeClr val="accent1"/>
+          </a:fillRef>
+          <a:effectRef idx="0">
+            <a:schemeClr val="accent1"/>
+          </a:effectRef>
+          <a:fontRef idx="minor">
+            <a:schemeClr val="lt1"/>
+          </a:fontRef>
+        </p:style>
+        <p:txBody>
+          <a:bodyPr rtlCol="0" anchor="ctr"/>
+          <a:lstStyle/>
+          <a:p>
+            <a:pPr algn="ctr"/>
+            <a:r>
+              <a:rPr lang="en-US" sz="1400" dirty="0">
+                <a:solidFill>
+                  <a:schemeClr val="tx1"/>
+                </a:solidFill>
+              </a:rPr>
+              <a:t>SD-PON</a:t>
+            </a:r>
+          </a:p>
+        </p:txBody>
+      </p:sp>
+      <p:grpSp>
+        <p:nvGrpSpPr>
+          <p:cNvPr id="152" name="Group 151">
+            <a:extLst>
+              <a:ext uri="{FF2B5EF4-FFF2-40B4-BE49-F238E27FC236}">
+                <a16:creationId xmlns:a16="http://schemas.microsoft.com/office/drawing/2014/main" id="{41490837-BFA8-4741-8FE4-541271C7D6B7}"/>
+              </a:ext>
+            </a:extLst>
+          </p:cNvPr>
+          <p:cNvGrpSpPr/>
+          <p:nvPr/>
+        </p:nvGrpSpPr>
+        <p:grpSpPr>
+          <a:xfrm>
+            <a:off x="3688424" y="1735179"/>
+            <a:ext cx="1087394" cy="598467"/>
+            <a:chOff x="9721328" y="1457026"/>
+            <a:chExt cx="1362617" cy="809197"/>
+          </a:xfrm>
+        </p:grpSpPr>
+        <p:sp>
+          <p:nvSpPr>
+            <p:cNvPr id="140" name="Rounded Rectangle 139">
+              <a:extLst>
+                <a:ext uri="{FF2B5EF4-FFF2-40B4-BE49-F238E27FC236}">
+                  <a16:creationId xmlns:a16="http://schemas.microsoft.com/office/drawing/2014/main" id="{89A8B142-9E7F-6C43-93CB-3C0259490D6F}"/>
+                </a:ext>
+              </a:extLst>
+            </p:cNvPr>
+            <p:cNvSpPr/>
+            <p:nvPr/>
+          </p:nvSpPr>
+          <p:spPr>
+            <a:xfrm>
+              <a:off x="9762356" y="1457026"/>
+              <a:ext cx="1277278" cy="809197"/>
+            </a:xfrm>
+            <a:prstGeom prst="roundRect">
+              <a:avLst>
+                <a:gd name="adj" fmla="val 10461"/>
+              </a:avLst>
+            </a:prstGeom>
+            <a:solidFill>
+              <a:schemeClr val="bg1">
+                <a:lumMod val="95000"/>
+              </a:schemeClr>
+            </a:solidFill>
+            <a:ln w="6350">
+              <a:solidFill>
+                <a:schemeClr val="tx1"/>
+              </a:solidFill>
+              <a:prstDash val="solid"/>
+            </a:ln>
+          </p:spPr>
+          <p:style>
+            <a:lnRef idx="2">
+              <a:schemeClr val="accent1">
+                <a:shade val="50000"/>
+              </a:schemeClr>
+            </a:lnRef>
+            <a:fillRef idx="1">
+              <a:schemeClr val="accent1"/>
+            </a:fillRef>
+            <a:effectRef idx="0">
+              <a:schemeClr val="accent1"/>
+            </a:effectRef>
+            <a:fontRef idx="minor">
+              <a:schemeClr val="lt1"/>
+            </a:fontRef>
+          </p:style>
+          <p:txBody>
+            <a:bodyPr rtlCol="0" anchor="ctr"/>
+            <a:lstStyle/>
+            <a:p>
+              <a:pPr algn="ctr"/>
+              <a:endParaRPr lang="en-US"/>
+            </a:p>
+          </p:txBody>
+        </p:sp>
+        <p:sp>
+          <p:nvSpPr>
+            <p:cNvPr id="141" name="Oval 140">
+              <a:extLst>
+                <a:ext uri="{FF2B5EF4-FFF2-40B4-BE49-F238E27FC236}">
+                  <a16:creationId xmlns:a16="http://schemas.microsoft.com/office/drawing/2014/main" id="{DE1FBBE7-A38C-7D4C-8A48-2C4B98574E93}"/>
+                </a:ext>
+              </a:extLst>
+            </p:cNvPr>
+            <p:cNvSpPr/>
+            <p:nvPr/>
+          </p:nvSpPr>
+          <p:spPr>
+            <a:xfrm>
+              <a:off x="9721328" y="1520042"/>
+              <a:ext cx="82056" cy="83127"/>
+            </a:xfrm>
+            <a:prstGeom prst="ellipse">
+              <a:avLst/>
+            </a:prstGeom>
+            <a:ln>
+              <a:solidFill>
+                <a:schemeClr val="accent1"/>
+              </a:solidFill>
+            </a:ln>
+          </p:spPr>
+          <p:style>
+            <a:lnRef idx="2">
+              <a:schemeClr val="accent1">
+                <a:shade val="50000"/>
+              </a:schemeClr>
+            </a:lnRef>
+            <a:fillRef idx="1">
+              <a:schemeClr val="accent1"/>
+            </a:fillRef>
+            <a:effectRef idx="0">
+              <a:schemeClr val="accent1"/>
+            </a:effectRef>
+            <a:fontRef idx="minor">
+              <a:schemeClr val="lt1"/>
+            </a:fontRef>
+          </p:style>
+          <p:txBody>
+            <a:bodyPr rtlCol="0" anchor="ctr"/>
+            <a:lstStyle/>
+            <a:p>
+              <a:pPr algn="ctr"/>
+              <a:endParaRPr lang="en-US"/>
+            </a:p>
+          </p:txBody>
+        </p:sp>
+        <p:sp>
+          <p:nvSpPr>
+            <p:cNvPr id="142" name="Oval 141">
+              <a:extLst>
+                <a:ext uri="{FF2B5EF4-FFF2-40B4-BE49-F238E27FC236}">
+                  <a16:creationId xmlns:a16="http://schemas.microsoft.com/office/drawing/2014/main" id="{A96978FA-CF2F-0F46-B2D2-7D3F3807A4D2}"/>
+                </a:ext>
+              </a:extLst>
+            </p:cNvPr>
+            <p:cNvSpPr/>
+            <p:nvPr/>
+          </p:nvSpPr>
+          <p:spPr>
+            <a:xfrm>
+              <a:off x="9721328" y="1672442"/>
+              <a:ext cx="82056" cy="83127"/>
+            </a:xfrm>
+            <a:prstGeom prst="ellipse">
+              <a:avLst/>
+            </a:prstGeom>
+            <a:ln>
+              <a:solidFill>
+                <a:schemeClr val="accent1"/>
+              </a:solidFill>
+            </a:ln>
+          </p:spPr>
+          <p:style>
+            <a:lnRef idx="2">
+              <a:schemeClr val="accent1">
+                <a:shade val="50000"/>
+              </a:schemeClr>
+            </a:lnRef>
+            <a:fillRef idx="1">
+              <a:schemeClr val="accent1"/>
+            </a:fillRef>
+            <a:effectRef idx="0">
+              <a:schemeClr val="accent1"/>
+            </a:effectRef>
+            <a:fontRef idx="minor">
+              <a:schemeClr val="lt1"/>
+            </a:fontRef>
+          </p:style>
+          <p:txBody>
+            <a:bodyPr rtlCol="0" anchor="ctr"/>
+            <a:lstStyle/>
+            <a:p>
+              <a:pPr algn="ctr"/>
+              <a:endParaRPr lang="en-US"/>
+            </a:p>
+          </p:txBody>
+        </p:sp>
+        <p:sp>
+          <p:nvSpPr>
+            <p:cNvPr id="143" name="Oval 142">
+              <a:extLst>
+                <a:ext uri="{FF2B5EF4-FFF2-40B4-BE49-F238E27FC236}">
+                  <a16:creationId xmlns:a16="http://schemas.microsoft.com/office/drawing/2014/main" id="{8213563E-5B0A-EA41-90A9-4DC8487CE884}"/>
+                </a:ext>
+              </a:extLst>
+            </p:cNvPr>
+            <p:cNvSpPr/>
+            <p:nvPr/>
+          </p:nvSpPr>
+          <p:spPr>
+            <a:xfrm>
+              <a:off x="9721328" y="1824842"/>
+              <a:ext cx="82056" cy="83127"/>
+            </a:xfrm>
+            <a:prstGeom prst="ellipse">
+              <a:avLst/>
+            </a:prstGeom>
+            <a:ln>
+              <a:solidFill>
+                <a:schemeClr val="accent1"/>
+              </a:solidFill>
+            </a:ln>
+          </p:spPr>
+          <p:style>
+            <a:lnRef idx="2">
+              <a:schemeClr val="accent1">
+                <a:shade val="50000"/>
+              </a:schemeClr>
+            </a:lnRef>
+            <a:fillRef idx="1">
+              <a:schemeClr val="accent1"/>
+            </a:fillRef>
+            <a:effectRef idx="0">
+              <a:schemeClr val="accent1"/>
+            </a:effectRef>
+            <a:fontRef idx="minor">
+              <a:schemeClr val="lt1"/>
+            </a:fontRef>
+          </p:style>
+          <p:txBody>
+            <a:bodyPr rtlCol="0" anchor="ctr"/>
+            <a:lstStyle/>
+            <a:p>
+              <a:pPr algn="ctr"/>
+              <a:endParaRPr lang="en-US"/>
+            </a:p>
+          </p:txBody>
+        </p:sp>
+        <p:sp>
+          <p:nvSpPr>
+            <p:cNvPr id="144" name="Oval 143">
+              <a:extLst>
+                <a:ext uri="{FF2B5EF4-FFF2-40B4-BE49-F238E27FC236}">
+                  <a16:creationId xmlns:a16="http://schemas.microsoft.com/office/drawing/2014/main" id="{B97D3FEB-51E0-A54D-8EB4-DC703339A1E0}"/>
+                </a:ext>
+              </a:extLst>
+            </p:cNvPr>
+            <p:cNvSpPr/>
+            <p:nvPr/>
+          </p:nvSpPr>
+          <p:spPr>
+            <a:xfrm>
+              <a:off x="9721328" y="1977242"/>
+              <a:ext cx="82056" cy="83127"/>
+            </a:xfrm>
+            <a:prstGeom prst="ellipse">
+              <a:avLst/>
+            </a:prstGeom>
+            <a:ln>
+              <a:solidFill>
+                <a:schemeClr val="accent1"/>
+              </a:solidFill>
+            </a:ln>
+          </p:spPr>
+          <p:style>
+            <a:lnRef idx="2">
+              <a:schemeClr val="accent1">
+                <a:shade val="50000"/>
+              </a:schemeClr>
+            </a:lnRef>
+            <a:fillRef idx="1">
+              <a:schemeClr val="accent1"/>
+            </a:fillRef>
+            <a:effectRef idx="0">
+              <a:schemeClr val="accent1"/>
+            </a:effectRef>
+            <a:fontRef idx="minor">
+              <a:schemeClr val="lt1"/>
+            </a:fontRef>
+          </p:style>
+          <p:txBody>
+            <a:bodyPr rtlCol="0" anchor="ctr"/>
+            <a:lstStyle/>
+            <a:p>
+              <a:pPr algn="ctr"/>
+              <a:endParaRPr lang="en-US"/>
+            </a:p>
+          </p:txBody>
+        </p:sp>
+        <p:sp>
+          <p:nvSpPr>
+            <p:cNvPr id="145" name="Oval 144">
+              <a:extLst>
+                <a:ext uri="{FF2B5EF4-FFF2-40B4-BE49-F238E27FC236}">
+                  <a16:creationId xmlns:a16="http://schemas.microsoft.com/office/drawing/2014/main" id="{7C52372E-B615-5B42-B83B-BAE89B12C769}"/>
+                </a:ext>
+              </a:extLst>
+            </p:cNvPr>
+            <p:cNvSpPr/>
+            <p:nvPr/>
+          </p:nvSpPr>
+          <p:spPr>
+            <a:xfrm>
+              <a:off x="9721328" y="2129642"/>
+              <a:ext cx="82056" cy="83127"/>
+            </a:xfrm>
+            <a:prstGeom prst="ellipse">
+              <a:avLst/>
+            </a:prstGeom>
+            <a:ln>
+              <a:solidFill>
+                <a:schemeClr val="accent1"/>
+              </a:solidFill>
+            </a:ln>
+          </p:spPr>
+          <p:style>
+            <a:lnRef idx="2">
+              <a:schemeClr val="accent1">
+                <a:shade val="50000"/>
+              </a:schemeClr>
+            </a:lnRef>
+            <a:fillRef idx="1">
+              <a:schemeClr val="accent1"/>
+            </a:fillRef>
+            <a:effectRef idx="0">
+              <a:schemeClr val="accent1"/>
+            </a:effectRef>
+            <a:fontRef idx="minor">
+              <a:schemeClr val="lt1"/>
+            </a:fontRef>
+          </p:style>
+          <p:txBody>
+            <a:bodyPr rtlCol="0" anchor="ctr"/>
+            <a:lstStyle/>
+            <a:p>
+              <a:pPr algn="ctr"/>
+              <a:endParaRPr lang="en-US"/>
+            </a:p>
+          </p:txBody>
+        </p:sp>
+        <p:sp>
+          <p:nvSpPr>
+            <p:cNvPr id="148" name="Oval 147">
+              <a:extLst>
+                <a:ext uri="{FF2B5EF4-FFF2-40B4-BE49-F238E27FC236}">
+                  <a16:creationId xmlns:a16="http://schemas.microsoft.com/office/drawing/2014/main" id="{31C75736-2271-1148-A5FB-725E31C3B679}"/>
+                </a:ext>
+              </a:extLst>
+            </p:cNvPr>
+            <p:cNvSpPr/>
+            <p:nvPr/>
+          </p:nvSpPr>
+          <p:spPr>
+            <a:xfrm>
+              <a:off x="11001889" y="1670463"/>
+              <a:ext cx="82056" cy="83127"/>
+            </a:xfrm>
+            <a:prstGeom prst="ellipse">
+              <a:avLst/>
+            </a:prstGeom>
+            <a:ln>
+              <a:solidFill>
+                <a:schemeClr val="accent1"/>
+              </a:solidFill>
+            </a:ln>
+          </p:spPr>
+          <p:style>
+            <a:lnRef idx="2">
+              <a:schemeClr val="accent1">
+                <a:shade val="50000"/>
+              </a:schemeClr>
+            </a:lnRef>
+            <a:fillRef idx="1">
+              <a:schemeClr val="accent1"/>
+            </a:fillRef>
+            <a:effectRef idx="0">
+              <a:schemeClr val="accent1"/>
+            </a:effectRef>
+            <a:fontRef idx="minor">
+              <a:schemeClr val="lt1"/>
+            </a:fontRef>
+          </p:style>
+          <p:txBody>
+            <a:bodyPr rtlCol="0" anchor="ctr"/>
+            <a:lstStyle/>
+            <a:p>
+              <a:pPr algn="ctr"/>
+              <a:endParaRPr lang="en-US"/>
+            </a:p>
+          </p:txBody>
+        </p:sp>
+        <p:sp>
+          <p:nvSpPr>
+            <p:cNvPr id="150" name="Oval 149">
+              <a:extLst>
+                <a:ext uri="{FF2B5EF4-FFF2-40B4-BE49-F238E27FC236}">
+                  <a16:creationId xmlns:a16="http://schemas.microsoft.com/office/drawing/2014/main" id="{86A4D127-4793-D744-91FA-A93EF77F8DD5}"/>
+                </a:ext>
+              </a:extLst>
+            </p:cNvPr>
+            <p:cNvSpPr/>
+            <p:nvPr/>
+          </p:nvSpPr>
+          <p:spPr>
+            <a:xfrm>
+              <a:off x="11001889" y="1975263"/>
+              <a:ext cx="82056" cy="83127"/>
+            </a:xfrm>
+            <a:prstGeom prst="ellipse">
+              <a:avLst/>
+            </a:prstGeom>
+            <a:ln>
+              <a:solidFill>
+                <a:schemeClr val="accent1"/>
+              </a:solidFill>
+            </a:ln>
+          </p:spPr>
+          <p:style>
+            <a:lnRef idx="2">
+              <a:schemeClr val="accent1">
+                <a:shade val="50000"/>
+              </a:schemeClr>
+            </a:lnRef>
+            <a:fillRef idx="1">
+              <a:schemeClr val="accent1"/>
+            </a:fillRef>
+            <a:effectRef idx="0">
+              <a:schemeClr val="accent1"/>
+            </a:effectRef>
+            <a:fontRef idx="minor">
+              <a:schemeClr val="lt1"/>
+            </a:fontRef>
+          </p:style>
+          <p:txBody>
+            <a:bodyPr rtlCol="0" anchor="ctr"/>
+            <a:lstStyle/>
+            <a:p>
+              <a:pPr algn="ctr"/>
+              <a:endParaRPr lang="en-US"/>
+            </a:p>
+          </p:txBody>
+        </p:sp>
+      </p:grpSp>
       <p:cxnSp>
         <p:nvCxnSpPr>
-          <p:cNvPr id="123" name="Straight Arrow Connector 122">
-            <a:extLst>
-              <a:ext uri="{FF2B5EF4-FFF2-40B4-BE49-F238E27FC236}">
-                <a16:creationId xmlns:a16="http://schemas.microsoft.com/office/drawing/2014/main" id="{81C47C1A-24BA-8A46-8669-5F8CF0941778}"/>
+          <p:cNvPr id="153" name="Straight Connector 152">
+            <a:extLst>
+              <a:ext uri="{FF2B5EF4-FFF2-40B4-BE49-F238E27FC236}">
+                <a16:creationId xmlns:a16="http://schemas.microsoft.com/office/drawing/2014/main" id="{FE08DD02-ED7A-BE4E-A7B7-E57325BE2A3E}"/>
               </a:ext>
             </a:extLst>
           </p:cNvPr>
           <p:cNvCxnSpPr>
             <a:cxnSpLocks/>
+            <a:stCxn id="109" idx="1"/>
           </p:cNvCxnSpPr>
           <p:nvPr/>
         </p:nvCxnSpPr>
         <p:spPr>
-          <a:xfrm>
-            <a:off x="7987886" y="4419408"/>
-            <a:ext cx="806576" cy="0"/>
-          </a:xfrm>
-          <a:prstGeom prst="straightConnector1">
+          <a:xfrm flipH="1" flipV="1">
+            <a:off x="5609967" y="4515516"/>
+            <a:ext cx="1072408" cy="185875"/>
+          </a:xfrm>
+          <a:prstGeom prst="line">
             <a:avLst/>
           </a:prstGeom>
           <a:ln w="19050">
-            <a:tailEnd type="triangle"/>
+            <a:tailEnd type="oval"/>
           </a:ln>
         </p:spPr>
         <p:style>
@@ -15984,41 +16435,6 @@
           </a:fontRef>
         </p:style>
       </p:cxnSp>
-      <p:sp>
-        <p:nvSpPr>
-          <p:cNvPr id="125" name="TextBox 124">
-            <a:extLst>
-              <a:ext uri="{FF2B5EF4-FFF2-40B4-BE49-F238E27FC236}">
-                <a16:creationId xmlns:a16="http://schemas.microsoft.com/office/drawing/2014/main" id="{3E33C132-9AA9-444A-B4F1-99BCD5E9867B}"/>
-              </a:ext>
-            </a:extLst>
-          </p:cNvPr>
-          <p:cNvSpPr txBox="1"/>
-          <p:nvPr/>
-        </p:nvSpPr>
-        <p:spPr>
-          <a:xfrm>
-            <a:off x="8788640" y="4258720"/>
-            <a:ext cx="796436" cy="338554"/>
-          </a:xfrm>
-          <a:prstGeom prst="rect">
-            <a:avLst/>
-          </a:prstGeom>
-          <a:noFill/>
-        </p:spPr>
-        <p:txBody>
-          <a:bodyPr wrap="none" rtlCol="0">
-            <a:spAutoFit/>
-          </a:bodyPr>
-          <a:lstStyle/>
-          <a:p>
-            <a:r>
-              <a:rPr lang="en-US" sz="1600" dirty="0"/>
-              <a:t>To BNG</a:t>
-            </a:r>
-          </a:p>
-        </p:txBody>
-      </p:sp>
     </p:spTree>
     <p:extLst>
       <p:ext uri="{BB962C8B-B14F-4D97-AF65-F5344CB8AC3E}">

</xml_diff>